<commit_message>
correcion en el powerpoint
</commit_message>
<xml_diff>
--- a/docs/consulta-calendario.pptx
+++ b/docs/consulta-calendario.pptx
@@ -332,7 +332,7 @@
           <a:p>
             <a:fld id="{88836C3A-9E39-4549-BCB1-DA298F7EEEDE}" type="datetimeFigureOut">
               <a:rPr lang="es-PY" smtClean="0"/>
-              <a:t>28/2/2022</a:t>
+              <a:t>1/3/2022</a:t>
             </a:fld>
             <a:endParaRPr lang="es-PY"/>
           </a:p>
@@ -749,7 +749,7 @@
           <a:p>
             <a:fld id="{130D795E-4F24-4E02-B844-EAC298A70C33}" type="datetime1">
               <a:rPr lang="es-PY" smtClean="0"/>
-              <a:t>28/2/2022</a:t>
+              <a:t>1/3/2022</a:t>
             </a:fld>
             <a:endParaRPr lang="es-PY"/>
           </a:p>
@@ -949,7 +949,7 @@
           <a:p>
             <a:fld id="{43D2C6B3-F7EE-4E54-8BD5-CBE0A9C14A74}" type="datetime1">
               <a:rPr lang="es-PY" smtClean="0"/>
-              <a:t>28/2/2022</a:t>
+              <a:t>1/3/2022</a:t>
             </a:fld>
             <a:endParaRPr lang="es-PY"/>
           </a:p>
@@ -1159,7 +1159,7 @@
           <a:p>
             <a:fld id="{AC74F60B-B5ED-44DE-BFF8-609EA162AF6B}" type="datetime1">
               <a:rPr lang="es-PY" smtClean="0"/>
-              <a:t>28/2/2022</a:t>
+              <a:t>1/3/2022</a:t>
             </a:fld>
             <a:endParaRPr lang="es-PY"/>
           </a:p>
@@ -1359,7 +1359,7 @@
           <a:p>
             <a:fld id="{AD8B11B9-186D-448E-8E59-536F70100583}" type="datetime1">
               <a:rPr lang="es-PY" smtClean="0"/>
-              <a:t>28/2/2022</a:t>
+              <a:t>1/3/2022</a:t>
             </a:fld>
             <a:endParaRPr lang="es-PY"/>
           </a:p>
@@ -1635,7 +1635,7 @@
           <a:p>
             <a:fld id="{2D598F9B-F851-4B5B-89EE-2A21136D11C8}" type="datetime1">
               <a:rPr lang="es-PY" smtClean="0"/>
-              <a:t>28/2/2022</a:t>
+              <a:t>1/3/2022</a:t>
             </a:fld>
             <a:endParaRPr lang="es-PY"/>
           </a:p>
@@ -1903,7 +1903,7 @@
           <a:p>
             <a:fld id="{7E24F9F2-40F8-4C99-9FE5-241389A27383}" type="datetime1">
               <a:rPr lang="es-PY" smtClean="0"/>
-              <a:t>28/2/2022</a:t>
+              <a:t>1/3/2022</a:t>
             </a:fld>
             <a:endParaRPr lang="es-PY"/>
           </a:p>
@@ -2318,7 +2318,7 @@
           <a:p>
             <a:fld id="{9AF10E93-E020-4024-9F1A-8FE1339B27DD}" type="datetime1">
               <a:rPr lang="es-PY" smtClean="0"/>
-              <a:t>28/2/2022</a:t>
+              <a:t>1/3/2022</a:t>
             </a:fld>
             <a:endParaRPr lang="es-PY"/>
           </a:p>
@@ -2460,7 +2460,7 @@
           <a:p>
             <a:fld id="{5F15DBC5-D7F7-4B6E-B517-02052F7DC43F}" type="datetime1">
               <a:rPr lang="es-PY" smtClean="0"/>
-              <a:t>28/2/2022</a:t>
+              <a:t>1/3/2022</a:t>
             </a:fld>
             <a:endParaRPr lang="es-PY"/>
           </a:p>
@@ -2573,7 +2573,7 @@
           <a:p>
             <a:fld id="{B7C654C8-2CF9-47C2-B6BB-191142A0002A}" type="datetime1">
               <a:rPr lang="es-PY" smtClean="0"/>
-              <a:t>28/2/2022</a:t>
+              <a:t>1/3/2022</a:t>
             </a:fld>
             <a:endParaRPr lang="es-PY"/>
           </a:p>
@@ -2886,7 +2886,7 @@
           <a:p>
             <a:fld id="{AC589009-4EB8-41DB-98C8-5E4BFF3AC97E}" type="datetime1">
               <a:rPr lang="es-PY" smtClean="0"/>
-              <a:t>28/2/2022</a:t>
+              <a:t>1/3/2022</a:t>
             </a:fld>
             <a:endParaRPr lang="es-PY"/>
           </a:p>
@@ -3175,7 +3175,7 @@
           <a:p>
             <a:fld id="{C398478A-55EF-4631-9DB8-D37CC1A7ECC5}" type="datetime1">
               <a:rPr lang="es-PY" smtClean="0"/>
-              <a:t>28/2/2022</a:t>
+              <a:t>1/3/2022</a:t>
             </a:fld>
             <a:endParaRPr lang="es-PY"/>
           </a:p>
@@ -3418,7 +3418,7 @@
           <a:p>
             <a:fld id="{C3F05E8E-BAB9-4E45-BC9E-BAC6DADC07A6}" type="datetime1">
               <a:rPr lang="es-PY" smtClean="0"/>
-              <a:t>28/2/2022</a:t>
+              <a:t>1/3/2022</a:t>
             </a:fld>
             <a:endParaRPr lang="es-PY"/>
           </a:p>
@@ -5006,7 +5006,7 @@
         <p:spPr>
           <a:xfrm>
             <a:off x="254480" y="1252154"/>
-            <a:ext cx="4360652" cy="1685610"/>
+            <a:ext cx="6137694" cy="1685610"/>
           </a:xfrm>
           <a:prstGeom prst="flowChartAlternateProcess">
             <a:avLst/>
@@ -5034,7 +5034,7 @@
           <a:p>
             <a:r>
               <a:rPr lang="es-PY" dirty="0"/>
-              <a:t>Las reservas se deberán poder visualizar: </a:t>
+              <a:t>De las reservas se deberán poder visualizar: </a:t>
             </a:r>
           </a:p>
           <a:p>

</xml_diff>